<commit_message>
Documents updated for more general use
</commit_message>
<xml_diff>
--- a/doc/XS_Presentation.pptx
+++ b/doc/XS_Presentation.pptx
@@ -7,7 +7,7 @@
     <p:sldMasterId id="2147483728" r:id="rId3"/>
   </p:sldMasterIdLst>
   <p:notesMasterIdLst>
-    <p:notesMasterId r:id="rId17"/>
+    <p:notesMasterId r:id="rId16"/>
   </p:notesMasterIdLst>
   <p:sldIdLst>
     <p:sldId id="270" r:id="rId4"/>
@@ -20,9 +20,8 @@
     <p:sldId id="385" r:id="rId11"/>
     <p:sldId id="384" r:id="rId12"/>
     <p:sldId id="382" r:id="rId13"/>
-    <p:sldId id="376" r:id="rId14"/>
-    <p:sldId id="352" r:id="rId15"/>
-    <p:sldId id="307" r:id="rId16"/>
+    <p:sldId id="352" r:id="rId14"/>
+    <p:sldId id="307" r:id="rId15"/>
   </p:sldIdLst>
   <p:sldSz cx="9144000" cy="6858000" type="screen4x3"/>
   <p:notesSz cx="6858000" cy="9144000"/>
@@ -222,7 +221,7 @@
           <a:p>
             <a:fld id="{9B966ED5-9185-BB45-BC17-12D6921F5CB6}" type="datetimeFigureOut">
               <a:rPr lang="en-US" smtClean="0"/>
-              <a:t>6/1/2015</a:t>
+              <a:t>6/11/2015</a:t>
             </a:fld>
             <a:endParaRPr lang="en-GB"/>
           </a:p>
@@ -1494,11 +1493,7 @@
           <a:bodyPr/>
           <a:lstStyle/>
           <a:p>
-            <a:r>
-              <a:rPr lang="en-GB" baseline="0" dirty="0" smtClean="0"/>
-              <a:t>VEP, Ensembl-IO.</a:t>
-            </a:r>
-            <a:endParaRPr lang="en-GB" dirty="0"/>
+            <a:endParaRPr lang="en-US" dirty="0"/>
           </a:p>
         </p:txBody>
       </p:sp>
@@ -1517,18 +1512,18 @@
           <a:bodyPr/>
           <a:lstStyle/>
           <a:p>
-            <a:fld id="{0C8A3780-3EE9-A848-9070-3EAA16D6693D}" type="slidenum">
-              <a:rPr lang="en-GB" smtClean="0"/>
+            <a:fld id="{3E5DEB2C-9A45-B240-ADF6-DF2FE1AAB192}" type="slidenum">
+              <a:rPr lang="en-US" smtClean="0"/>
               <a:t>11</a:t>
             </a:fld>
-            <a:endParaRPr lang="en-GB"/>
+            <a:endParaRPr lang="en-US"/>
           </a:p>
         </p:txBody>
       </p:sp>
     </p:spTree>
     <p:extLst>
       <p:ext uri="{BB962C8B-B14F-4D97-AF65-F5344CB8AC3E}">
-        <p14:creationId xmlns:p14="http://schemas.microsoft.com/office/powerpoint/2010/main" val="2188236089"/>
+        <p14:creationId xmlns:p14="http://schemas.microsoft.com/office/powerpoint/2010/main" val="3127203647"/>
       </p:ext>
     </p:extLst>
   </p:cSld>
@@ -1609,95 +1604,6 @@
             <a:fld id="{3E5DEB2C-9A45-B240-ADF6-DF2FE1AAB192}" type="slidenum">
               <a:rPr lang="en-US" smtClean="0"/>
               <a:t>12</a:t>
-            </a:fld>
-            <a:endParaRPr lang="en-US"/>
-          </a:p>
-        </p:txBody>
-      </p:sp>
-    </p:spTree>
-    <p:extLst>
-      <p:ext uri="{BB962C8B-B14F-4D97-AF65-F5344CB8AC3E}">
-        <p14:creationId xmlns:p14="http://schemas.microsoft.com/office/powerpoint/2010/main" val="3127203647"/>
-      </p:ext>
-    </p:extLst>
-  </p:cSld>
-  <p:clrMapOvr>
-    <a:masterClrMapping/>
-  </p:clrMapOvr>
-</p:notes>
-</file>
-
-<file path=ppt/notesSlides/notesSlide9.xml><?xml version="1.0" encoding="utf-8"?>
-<p:notes xmlns:a="http://schemas.openxmlformats.org/drawingml/2006/main" xmlns:r="http://schemas.openxmlformats.org/officeDocument/2006/relationships" xmlns:p="http://schemas.openxmlformats.org/presentationml/2006/main">
-  <p:cSld>
-    <p:spTree>
-      <p:nvGrpSpPr>
-        <p:cNvPr id="1" name=""/>
-        <p:cNvGrpSpPr/>
-        <p:nvPr/>
-      </p:nvGrpSpPr>
-      <p:grpSpPr>
-        <a:xfrm>
-          <a:off x="0" y="0"/>
-          <a:ext cx="0" cy="0"/>
-          <a:chOff x="0" y="0"/>
-          <a:chExt cx="0" cy="0"/>
-        </a:xfrm>
-      </p:grpSpPr>
-      <p:sp>
-        <p:nvSpPr>
-          <p:cNvPr id="2" name="Slide Image Placeholder 1"/>
-          <p:cNvSpPr>
-            <a:spLocks noGrp="1" noRot="1" noChangeAspect="1"/>
-          </p:cNvSpPr>
-          <p:nvPr>
-            <p:ph type="sldImg"/>
-          </p:nvPr>
-        </p:nvSpPr>
-        <p:spPr>
-          <a:xfrm>
-            <a:off x="1143000" y="685800"/>
-            <a:ext cx="4572000" cy="3429000"/>
-          </a:xfrm>
-        </p:spPr>
-      </p:sp>
-      <p:sp>
-        <p:nvSpPr>
-          <p:cNvPr id="3" name="Notes Placeholder 2"/>
-          <p:cNvSpPr>
-            <a:spLocks noGrp="1"/>
-          </p:cNvSpPr>
-          <p:nvPr>
-            <p:ph type="body" idx="1"/>
-          </p:nvPr>
-        </p:nvSpPr>
-        <p:spPr/>
-        <p:txBody>
-          <a:bodyPr/>
-          <a:lstStyle/>
-          <a:p>
-            <a:endParaRPr lang="en-US" dirty="0"/>
-          </a:p>
-        </p:txBody>
-      </p:sp>
-      <p:sp>
-        <p:nvSpPr>
-          <p:cNvPr id="4" name="Slide Number Placeholder 3"/>
-          <p:cNvSpPr>
-            <a:spLocks noGrp="1"/>
-          </p:cNvSpPr>
-          <p:nvPr>
-            <p:ph type="sldNum" sz="quarter" idx="10"/>
-          </p:nvPr>
-        </p:nvSpPr>
-        <p:spPr/>
-        <p:txBody>
-          <a:bodyPr/>
-          <a:lstStyle/>
-          <a:p>
-            <a:fld id="{3E5DEB2C-9A45-B240-ADF6-DF2FE1AAB192}" type="slidenum">
-              <a:rPr lang="en-US" smtClean="0"/>
-              <a:t>13</a:t>
             </a:fld>
             <a:endParaRPr lang="en-US"/>
           </a:p>
@@ -1902,7 +1808,7 @@
             <a:fld id="{8B8EBFBB-83D1-8240-AD5F-294C01738ECC}" type="datetime1">
               <a:rPr lang="en-US"/>
               <a:pPr/>
-              <a:t>6/1/2015</a:t>
+              <a:t>6/11/2015</a:t>
             </a:fld>
             <a:endParaRPr lang="en-US"/>
           </a:p>
@@ -3944,7 +3850,7 @@
             <a:fld id="{F778CF00-ED75-CC4A-93D9-89DFA77B0BB3}" type="datetime1">
               <a:rPr lang="en-US"/>
               <a:pPr/>
-              <a:t>6/1/2015</a:t>
+              <a:t>6/11/2015</a:t>
             </a:fld>
             <a:endParaRPr lang="en-US"/>
           </a:p>
@@ -4255,7 +4161,7 @@
             <a:fld id="{4DB28ACA-D732-8A4F-967C-082801BED23F}" type="datetime1">
               <a:rPr lang="en-US"/>
               <a:pPr/>
-              <a:t>6/1/2015</a:t>
+              <a:t>6/11/2015</a:t>
             </a:fld>
             <a:endParaRPr lang="en-US"/>
           </a:p>
@@ -4520,7 +4426,7 @@
             <a:fld id="{F3143CD0-A9C4-EB4A-81B5-4B032B07BC24}" type="datetime1">
               <a:rPr lang="en-US"/>
               <a:pPr/>
-              <a:t>6/1/2015</a:t>
+              <a:t>6/11/2015</a:t>
             </a:fld>
             <a:endParaRPr lang="en-US"/>
           </a:p>
@@ -4713,7 +4619,7 @@
             <a:fld id="{C7672EA7-23EB-824A-BC08-211A11C260A4}" type="datetime1">
               <a:rPr lang="en-US"/>
               <a:pPr/>
-              <a:t>6/1/2015</a:t>
+              <a:t>6/11/2015</a:t>
             </a:fld>
             <a:endParaRPr lang="en-US"/>
           </a:p>
@@ -5024,7 +4930,7 @@
             <a:fld id="{25177AB9-3462-9247-84CA-E1735DB4A189}" type="datetime1">
               <a:rPr lang="en-US"/>
               <a:pPr/>
-              <a:t>6/1/2015</a:t>
+              <a:t>6/11/2015</a:t>
             </a:fld>
             <a:endParaRPr lang="en-US"/>
           </a:p>
@@ -5325,14 +5231,14 @@
           </a:ln>
           <a:extLst>
             <a:ext uri="{909E8E84-426E-40dd-AFC4-6F175D3DCCD1}">
-              <a14:hiddenFill xmlns:a14="http://schemas.microsoft.com/office/drawing/2010/main" xmlns="">
+              <a14:hiddenFill xmlns="" xmlns:a14="http://schemas.microsoft.com/office/drawing/2010/main">
                 <a:solidFill>
                   <a:srgbClr val="FFFFFF"/>
                 </a:solidFill>
               </a14:hiddenFill>
             </a:ext>
             <a:ext uri="{91240B29-F687-4f45-9708-019B960494DF}">
-              <a14:hiddenLine xmlns:a14="http://schemas.microsoft.com/office/drawing/2010/main" xmlns="" w="9525">
+              <a14:hiddenLine xmlns="" xmlns:a14="http://schemas.microsoft.com/office/drawing/2010/main" w="9525">
                 <a:solidFill>
                   <a:srgbClr val="000000"/>
                 </a:solidFill>
@@ -5379,14 +5285,14 @@
           </a:ln>
           <a:extLst>
             <a:ext uri="{909E8E84-426E-40dd-AFC4-6F175D3DCCD1}">
-              <a14:hiddenFill xmlns:a14="http://schemas.microsoft.com/office/drawing/2010/main" xmlns="">
+              <a14:hiddenFill xmlns="" xmlns:a14="http://schemas.microsoft.com/office/drawing/2010/main">
                 <a:solidFill>
                   <a:srgbClr val="FFFFFF"/>
                 </a:solidFill>
               </a14:hiddenFill>
             </a:ext>
             <a:ext uri="{91240B29-F687-4f45-9708-019B960494DF}">
-              <a14:hiddenLine xmlns:a14="http://schemas.microsoft.com/office/drawing/2010/main" xmlns="" w="9525">
+              <a14:hiddenLine xmlns="" xmlns:a14="http://schemas.microsoft.com/office/drawing/2010/main" w="9525">
                 <a:solidFill>
                   <a:srgbClr val="000000"/>
                 </a:solidFill>
@@ -5433,14 +5339,14 @@
           </a:ln>
           <a:extLst>
             <a:ext uri="{909E8E84-426E-40dd-AFC4-6F175D3DCCD1}">
-              <a14:hiddenFill xmlns:a14="http://schemas.microsoft.com/office/drawing/2010/main" xmlns="">
+              <a14:hiddenFill xmlns="" xmlns:a14="http://schemas.microsoft.com/office/drawing/2010/main">
                 <a:solidFill>
                   <a:srgbClr val="FFFFFF"/>
                 </a:solidFill>
               </a14:hiddenFill>
             </a:ext>
             <a:ext uri="{91240B29-F687-4f45-9708-019B960494DF}">
-              <a14:hiddenLine xmlns:a14="http://schemas.microsoft.com/office/drawing/2010/main" xmlns="" w="9525">
+              <a14:hiddenLine xmlns="" xmlns:a14="http://schemas.microsoft.com/office/drawing/2010/main" w="9525">
                 <a:solidFill>
                   <a:srgbClr val="000000"/>
                 </a:solidFill>
@@ -5977,14 +5883,14 @@
           </a:ln>
           <a:extLst>
             <a:ext uri="{909E8E84-426E-40dd-AFC4-6F175D3DCCD1}">
-              <a14:hiddenFill xmlns:a14="http://schemas.microsoft.com/office/drawing/2010/main" xmlns="">
+              <a14:hiddenFill xmlns="" xmlns:a14="http://schemas.microsoft.com/office/drawing/2010/main">
                 <a:solidFill>
                   <a:srgbClr val="FFFFFF"/>
                 </a:solidFill>
               </a14:hiddenFill>
             </a:ext>
             <a:ext uri="{91240B29-F687-4f45-9708-019B960494DF}">
-              <a14:hiddenLine xmlns:a14="http://schemas.microsoft.com/office/drawing/2010/main" xmlns="" w="9525">
+              <a14:hiddenLine xmlns="" xmlns:a14="http://schemas.microsoft.com/office/drawing/2010/main" w="9525">
                 <a:solidFill>
                   <a:srgbClr val="000000"/>
                 </a:solidFill>
@@ -5994,7 +5900,7 @@
               </a14:hiddenLine>
             </a:ext>
             <a:ext uri="{FAA26D3D-D897-4be2-8F04-BA451C77F1D7}">
-              <ma14:placeholderFlag xmlns:ma14="http://schemas.microsoft.com/office/mac/drawingml/2011/main" xmlns="" val="1"/>
+              <ma14:placeholderFlag xmlns="" xmlns:ma14="http://schemas.microsoft.com/office/mac/drawingml/2011/main" val="1"/>
             </a:ext>
           </a:extLst>
         </p:spPr>
@@ -6039,14 +5945,14 @@
           </a:ln>
           <a:extLst>
             <a:ext uri="{909E8E84-426E-40dd-AFC4-6F175D3DCCD1}">
-              <a14:hiddenFill xmlns:a14="http://schemas.microsoft.com/office/drawing/2010/main" xmlns="">
+              <a14:hiddenFill xmlns="" xmlns:a14="http://schemas.microsoft.com/office/drawing/2010/main">
                 <a:solidFill>
                   <a:srgbClr val="FFFFFF"/>
                 </a:solidFill>
               </a14:hiddenFill>
             </a:ext>
             <a:ext uri="{91240B29-F687-4f45-9708-019B960494DF}">
-              <a14:hiddenLine xmlns:a14="http://schemas.microsoft.com/office/drawing/2010/main" xmlns="" w="9525">
+              <a14:hiddenLine xmlns="" xmlns:a14="http://schemas.microsoft.com/office/drawing/2010/main" w="9525">
                 <a:solidFill>
                   <a:srgbClr val="000000"/>
                 </a:solidFill>
@@ -6056,7 +5962,7 @@
               </a14:hiddenLine>
             </a:ext>
             <a:ext uri="{FAA26D3D-D897-4be2-8F04-BA451C77F1D7}">
-              <ma14:placeholderFlag xmlns:ma14="http://schemas.microsoft.com/office/mac/drawingml/2011/main" xmlns="" val="1"/>
+              <ma14:placeholderFlag xmlns="" xmlns:ma14="http://schemas.microsoft.com/office/mac/drawingml/2011/main" val="1"/>
             </a:ext>
           </a:extLst>
         </p:spPr>
@@ -6162,7 +6068,7 @@
                   <a:spcPct val="0"/>
                 </a:spcAft>
               </a:pPr>
-              <a:t>6/1/2015</a:t>
+              <a:t>6/11/2015</a:t>
             </a:fld>
             <a:endParaRPr lang="en-US">
               <a:latin typeface="Arial" charset="0"/>
@@ -6544,14 +6450,14 @@
           </a:ln>
           <a:extLst>
             <a:ext uri="{909E8E84-426E-40dd-AFC4-6F175D3DCCD1}">
-              <a14:hiddenFill xmlns:a14="http://schemas.microsoft.com/office/drawing/2010/main" xmlns="">
+              <a14:hiddenFill xmlns="" xmlns:a14="http://schemas.microsoft.com/office/drawing/2010/main">
                 <a:solidFill>
                   <a:srgbClr val="FFFFFF"/>
                 </a:solidFill>
               </a14:hiddenFill>
             </a:ext>
             <a:ext uri="{91240B29-F687-4f45-9708-019B960494DF}">
-              <a14:hiddenLine xmlns:a14="http://schemas.microsoft.com/office/drawing/2010/main" xmlns="" w="9525">
+              <a14:hiddenLine xmlns="" xmlns:a14="http://schemas.microsoft.com/office/drawing/2010/main" w="9525">
                 <a:solidFill>
                   <a:srgbClr val="000000"/>
                 </a:solidFill>
@@ -6598,14 +6504,14 @@
           </a:ln>
           <a:extLst>
             <a:ext uri="{909E8E84-426E-40dd-AFC4-6F175D3DCCD1}">
-              <a14:hiddenFill xmlns:a14="http://schemas.microsoft.com/office/drawing/2010/main" xmlns="">
+              <a14:hiddenFill xmlns="" xmlns:a14="http://schemas.microsoft.com/office/drawing/2010/main">
                 <a:solidFill>
                   <a:srgbClr val="FFFFFF"/>
                 </a:solidFill>
               </a14:hiddenFill>
             </a:ext>
             <a:ext uri="{91240B29-F687-4f45-9708-019B960494DF}">
-              <a14:hiddenLine xmlns:a14="http://schemas.microsoft.com/office/drawing/2010/main" xmlns="" w="9525">
+              <a14:hiddenLine xmlns="" xmlns:a14="http://schemas.microsoft.com/office/drawing/2010/main" w="9525">
                 <a:solidFill>
                   <a:srgbClr val="000000"/>
                 </a:solidFill>
@@ -6652,14 +6558,14 @@
           </a:ln>
           <a:extLst>
             <a:ext uri="{909E8E84-426E-40dd-AFC4-6F175D3DCCD1}">
-              <a14:hiddenFill xmlns:a14="http://schemas.microsoft.com/office/drawing/2010/main" xmlns="">
+              <a14:hiddenFill xmlns="" xmlns:a14="http://schemas.microsoft.com/office/drawing/2010/main">
                 <a:solidFill>
                   <a:srgbClr val="FFFFFF"/>
                 </a:solidFill>
               </a14:hiddenFill>
             </a:ext>
             <a:ext uri="{91240B29-F687-4f45-9708-019B960494DF}">
-              <a14:hiddenLine xmlns:a14="http://schemas.microsoft.com/office/drawing/2010/main" xmlns="" w="9525">
+              <a14:hiddenLine xmlns="" xmlns:a14="http://schemas.microsoft.com/office/drawing/2010/main" w="9525">
                 <a:solidFill>
                   <a:srgbClr val="000000"/>
                 </a:solidFill>
@@ -7128,14 +7034,14 @@
           </a:ln>
           <a:extLst>
             <a:ext uri="{909E8E84-426E-40dd-AFC4-6F175D3DCCD1}">
-              <a14:hiddenFill xmlns:a14="http://schemas.microsoft.com/office/drawing/2010/main" xmlns="">
+              <a14:hiddenFill xmlns="" xmlns:a14="http://schemas.microsoft.com/office/drawing/2010/main">
                 <a:solidFill>
                   <a:srgbClr val="FFFFFF"/>
                 </a:solidFill>
               </a14:hiddenFill>
             </a:ext>
             <a:ext uri="{91240B29-F687-4f45-9708-019B960494DF}">
-              <a14:hiddenLine xmlns:a14="http://schemas.microsoft.com/office/drawing/2010/main" xmlns="" w="9525">
+              <a14:hiddenLine xmlns="" xmlns:a14="http://schemas.microsoft.com/office/drawing/2010/main" w="9525">
                 <a:solidFill>
                   <a:srgbClr val="000000"/>
                 </a:solidFill>
@@ -7145,7 +7051,7 @@
               </a14:hiddenLine>
             </a:ext>
             <a:ext uri="{FAA26D3D-D897-4be2-8F04-BA451C77F1D7}">
-              <ma14:placeholderFlag xmlns:ma14="http://schemas.microsoft.com/office/mac/drawingml/2011/main" xmlns="" val="1"/>
+              <ma14:placeholderFlag xmlns="" xmlns:ma14="http://schemas.microsoft.com/office/mac/drawingml/2011/main" val="1"/>
             </a:ext>
           </a:extLst>
         </p:spPr>
@@ -7190,14 +7096,14 @@
           </a:ln>
           <a:extLst>
             <a:ext uri="{909E8E84-426E-40dd-AFC4-6F175D3DCCD1}">
-              <a14:hiddenFill xmlns:a14="http://schemas.microsoft.com/office/drawing/2010/main" xmlns="">
+              <a14:hiddenFill xmlns="" xmlns:a14="http://schemas.microsoft.com/office/drawing/2010/main">
                 <a:solidFill>
                   <a:srgbClr val="FFFFFF"/>
                 </a:solidFill>
               </a14:hiddenFill>
             </a:ext>
             <a:ext uri="{91240B29-F687-4f45-9708-019B960494DF}">
-              <a14:hiddenLine xmlns:a14="http://schemas.microsoft.com/office/drawing/2010/main" xmlns="" w="9525">
+              <a14:hiddenLine xmlns="" xmlns:a14="http://schemas.microsoft.com/office/drawing/2010/main" w="9525">
                 <a:solidFill>
                   <a:srgbClr val="000000"/>
                 </a:solidFill>
@@ -7207,7 +7113,7 @@
               </a14:hiddenLine>
             </a:ext>
             <a:ext uri="{FAA26D3D-D897-4be2-8F04-BA451C77F1D7}">
-              <ma14:placeholderFlag xmlns:ma14="http://schemas.microsoft.com/office/mac/drawingml/2011/main" xmlns="" val="1"/>
+              <ma14:placeholderFlag xmlns="" xmlns:ma14="http://schemas.microsoft.com/office/mac/drawingml/2011/main" val="1"/>
             </a:ext>
           </a:extLst>
         </p:spPr>
@@ -7313,7 +7219,7 @@
                   <a:spcPct val="0"/>
                 </a:spcAft>
               </a:pPr>
-              <a:t>6/1/2015</a:t>
+              <a:t>6/11/2015</a:t>
             </a:fld>
             <a:endParaRPr lang="en-US">
               <a:latin typeface="Arial" charset="0"/>
@@ -7695,14 +7601,14 @@
           </a:ln>
           <a:extLst>
             <a:ext uri="{909E8E84-426E-40dd-AFC4-6F175D3DCCD1}">
-              <a14:hiddenFill xmlns:a14="http://schemas.microsoft.com/office/drawing/2010/main" xmlns="">
+              <a14:hiddenFill xmlns="" xmlns:a14="http://schemas.microsoft.com/office/drawing/2010/main">
                 <a:solidFill>
                   <a:srgbClr val="FFFFFF"/>
                 </a:solidFill>
               </a14:hiddenFill>
             </a:ext>
             <a:ext uri="{91240B29-F687-4f45-9708-019B960494DF}">
-              <a14:hiddenLine xmlns:a14="http://schemas.microsoft.com/office/drawing/2010/main" xmlns="" w="9525">
+              <a14:hiddenLine xmlns="" xmlns:a14="http://schemas.microsoft.com/office/drawing/2010/main" w="9525">
                 <a:solidFill>
                   <a:srgbClr val="000000"/>
                 </a:solidFill>
@@ -8185,14 +8091,14 @@
           </a:ln>
           <a:extLst>
             <a:ext uri="{909E8E84-426E-40dd-AFC4-6F175D3DCCD1}">
-              <a14:hiddenFill xmlns:a14="http://schemas.microsoft.com/office/drawing/2010/main" xmlns="">
+              <a14:hiddenFill xmlns="" xmlns:a14="http://schemas.microsoft.com/office/drawing/2010/main">
                 <a:solidFill>
                   <a:srgbClr val="FFFFFF"/>
                 </a:solidFill>
               </a14:hiddenFill>
             </a:ext>
             <a:ext uri="{91240B29-F687-4f45-9708-019B960494DF}">
-              <a14:hiddenLine xmlns:a14="http://schemas.microsoft.com/office/drawing/2010/main" xmlns="" w="9525">
+              <a14:hiddenLine xmlns="" xmlns:a14="http://schemas.microsoft.com/office/drawing/2010/main" w="9525">
                 <a:solidFill>
                   <a:srgbClr val="000000"/>
                 </a:solidFill>
@@ -8228,14 +8134,14 @@
           </a:ln>
           <a:extLst>
             <a:ext uri="{909E8E84-426E-40dd-AFC4-6F175D3DCCD1}">
-              <a14:hiddenFill xmlns:a14="http://schemas.microsoft.com/office/drawing/2010/main" xmlns="">
+              <a14:hiddenFill xmlns="" xmlns:a14="http://schemas.microsoft.com/office/drawing/2010/main">
                 <a:solidFill>
                   <a:srgbClr val="FFFFFF"/>
                 </a:solidFill>
               </a14:hiddenFill>
             </a:ext>
             <a:ext uri="{91240B29-F687-4f45-9708-019B960494DF}">
-              <a14:hiddenLine xmlns:a14="http://schemas.microsoft.com/office/drawing/2010/main" xmlns="" w="9525">
+              <a14:hiddenLine xmlns="" xmlns:a14="http://schemas.microsoft.com/office/drawing/2010/main" w="9525">
                 <a:solidFill>
                   <a:srgbClr val="000000"/>
                 </a:solidFill>
@@ -8245,7 +8151,7 @@
               </a14:hiddenLine>
             </a:ext>
             <a:ext uri="{FAA26D3D-D897-4be2-8F04-BA451C77F1D7}">
-              <ma14:placeholderFlag xmlns:ma14="http://schemas.microsoft.com/office/mac/drawingml/2011/main" xmlns="" val="1"/>
+              <ma14:placeholderFlag xmlns="" xmlns:ma14="http://schemas.microsoft.com/office/mac/drawingml/2011/main" val="1"/>
             </a:ext>
           </a:extLst>
         </p:spPr>
@@ -8289,14 +8195,14 @@
           </a:ln>
           <a:extLst>
             <a:ext uri="{909E8E84-426E-40dd-AFC4-6F175D3DCCD1}">
-              <a14:hiddenFill xmlns:a14="http://schemas.microsoft.com/office/drawing/2010/main" xmlns="">
+              <a14:hiddenFill xmlns="" xmlns:a14="http://schemas.microsoft.com/office/drawing/2010/main">
                 <a:solidFill>
                   <a:srgbClr val="FFFFFF"/>
                 </a:solidFill>
               </a14:hiddenFill>
             </a:ext>
             <a:ext uri="{91240B29-F687-4f45-9708-019B960494DF}">
-              <a14:hiddenLine xmlns:a14="http://schemas.microsoft.com/office/drawing/2010/main" xmlns="" w="9525">
+              <a14:hiddenLine xmlns="" xmlns:a14="http://schemas.microsoft.com/office/drawing/2010/main" w="9525">
                 <a:solidFill>
                   <a:srgbClr val="000000"/>
                 </a:solidFill>
@@ -8306,7 +8212,7 @@
               </a14:hiddenLine>
             </a:ext>
             <a:ext uri="{FAA26D3D-D897-4be2-8F04-BA451C77F1D7}">
-              <ma14:placeholderFlag xmlns:ma14="http://schemas.microsoft.com/office/mac/drawingml/2011/main" xmlns="" val="1"/>
+              <ma14:placeholderFlag xmlns="" xmlns:ma14="http://schemas.microsoft.com/office/mac/drawingml/2011/main" val="1"/>
             </a:ext>
           </a:extLst>
         </p:spPr>
@@ -8507,14 +8413,14 @@
           </a:ln>
           <a:extLst>
             <a:ext uri="{909E8E84-426E-40dd-AFC4-6F175D3DCCD1}">
-              <a14:hiddenFill xmlns:a14="http://schemas.microsoft.com/office/drawing/2010/main" xmlns="">
+              <a14:hiddenFill xmlns="" xmlns:a14="http://schemas.microsoft.com/office/drawing/2010/main">
                 <a:solidFill>
                   <a:srgbClr val="FFFFFF"/>
                 </a:solidFill>
               </a14:hiddenFill>
             </a:ext>
             <a:ext uri="{91240B29-F687-4f45-9708-019B960494DF}">
-              <a14:hiddenLine xmlns:a14="http://schemas.microsoft.com/office/drawing/2010/main" xmlns="" w="9525">
+              <a14:hiddenLine xmlns="" xmlns:a14="http://schemas.microsoft.com/office/drawing/2010/main" w="9525">
                 <a:solidFill>
                   <a:srgbClr val="000000"/>
                 </a:solidFill>
@@ -8561,14 +8467,14 @@
           </a:ln>
           <a:extLst>
             <a:ext uri="{909E8E84-426E-40dd-AFC4-6F175D3DCCD1}">
-              <a14:hiddenFill xmlns:a14="http://schemas.microsoft.com/office/drawing/2010/main" xmlns="">
+              <a14:hiddenFill xmlns="" xmlns:a14="http://schemas.microsoft.com/office/drawing/2010/main">
                 <a:solidFill>
                   <a:srgbClr val="FFFFFF"/>
                 </a:solidFill>
               </a14:hiddenFill>
             </a:ext>
             <a:ext uri="{91240B29-F687-4f45-9708-019B960494DF}">
-              <a14:hiddenLine xmlns:a14="http://schemas.microsoft.com/office/drawing/2010/main" xmlns="" w="9525">
+              <a14:hiddenLine xmlns="" xmlns:a14="http://schemas.microsoft.com/office/drawing/2010/main" w="9525">
                 <a:solidFill>
                   <a:srgbClr val="000000"/>
                 </a:solidFill>
@@ -8615,14 +8521,14 @@
           </a:ln>
           <a:extLst>
             <a:ext uri="{909E8E84-426E-40dd-AFC4-6F175D3DCCD1}">
-              <a14:hiddenFill xmlns:a14="http://schemas.microsoft.com/office/drawing/2010/main" xmlns="">
+              <a14:hiddenFill xmlns="" xmlns:a14="http://schemas.microsoft.com/office/drawing/2010/main">
                 <a:solidFill>
                   <a:srgbClr val="FFFFFF"/>
                 </a:solidFill>
               </a14:hiddenFill>
             </a:ext>
             <a:ext uri="{91240B29-F687-4f45-9708-019B960494DF}">
-              <a14:hiddenLine xmlns:a14="http://schemas.microsoft.com/office/drawing/2010/main" xmlns="" w="9525">
+              <a14:hiddenLine xmlns="" xmlns:a14="http://schemas.microsoft.com/office/drawing/2010/main" w="9525">
                 <a:solidFill>
                   <a:srgbClr val="000000"/>
                 </a:solidFill>
@@ -9223,7 +9129,11 @@
           <a:p>
             <a:r>
               <a:rPr lang="en-US" dirty="0" smtClean="0"/>
-              <a:t>Case Studies</a:t>
+              <a:t>Ensembl Case </a:t>
+            </a:r>
+            <a:r>
+              <a:rPr lang="en-US" dirty="0" smtClean="0"/>
+              <a:t>Studies</a:t>
             </a:r>
             <a:endParaRPr lang="en-GB" dirty="0"/>
           </a:p>
@@ -9430,133 +9340,6 @@
           <a:lstStyle/>
           <a:p>
             <a:r>
-              <a:rPr lang="en-GB" dirty="0" smtClean="0"/>
-              <a:t>Install Procedures</a:t>
-            </a:r>
-            <a:endParaRPr lang="en-GB" dirty="0"/>
-          </a:p>
-        </p:txBody>
-      </p:sp>
-      <p:sp>
-        <p:nvSpPr>
-          <p:cNvPr id="3" name="Content Placeholder 2"/>
-          <p:cNvSpPr>
-            <a:spLocks noGrp="1"/>
-          </p:cNvSpPr>
-          <p:nvPr>
-            <p:ph idx="1"/>
-          </p:nvPr>
-        </p:nvSpPr>
-        <p:spPr/>
-        <p:txBody>
-          <a:bodyPr/>
-          <a:lstStyle/>
-          <a:p>
-            <a:r>
-              <a:rPr lang="en-GB" dirty="0" smtClean="0"/>
-              <a:t>User Downloads</a:t>
-            </a:r>
-          </a:p>
-          <a:p>
-            <a:r>
-              <a:rPr lang="en-GB" dirty="0" smtClean="0"/>
-              <a:t>Install script</a:t>
-            </a:r>
-          </a:p>
-          <a:p>
-            <a:pPr lvl="1"/>
-            <a:r>
-              <a:rPr lang="en-GB" dirty="0" smtClean="0"/>
-              <a:t>Check for build tools</a:t>
-            </a:r>
-          </a:p>
-          <a:p>
-            <a:pPr lvl="1"/>
-            <a:r>
-              <a:rPr lang="en-GB" dirty="0" smtClean="0"/>
-              <a:t>Check for the C library</a:t>
-            </a:r>
-          </a:p>
-          <a:p>
-            <a:pPr lvl="2"/>
-            <a:r>
-              <a:rPr lang="en-GB" dirty="0" smtClean="0"/>
-              <a:t>Install if required (easier to do a local install if not on the system)</a:t>
-            </a:r>
-          </a:p>
-          <a:p>
-            <a:pPr lvl="1"/>
-            <a:r>
-              <a:rPr lang="en-GB" dirty="0" err="1" smtClean="0"/>
-              <a:t>Makefile</a:t>
-            </a:r>
-            <a:endParaRPr lang="en-GB" dirty="0" smtClean="0"/>
-          </a:p>
-          <a:p>
-            <a:pPr lvl="2"/>
-            <a:r>
-              <a:rPr lang="en-GB" dirty="0" smtClean="0"/>
-              <a:t>set links if required</a:t>
-            </a:r>
-          </a:p>
-          <a:p>
-            <a:endParaRPr lang="en-GB" dirty="0"/>
-          </a:p>
-        </p:txBody>
-      </p:sp>
-    </p:spTree>
-    <p:extLst>
-      <p:ext uri="{BB962C8B-B14F-4D97-AF65-F5344CB8AC3E}">
-        <p14:creationId xmlns:p14="http://schemas.microsoft.com/office/powerpoint/2010/main" val="1421203559"/>
-      </p:ext>
-    </p:extLst>
-  </p:cSld>
-  <p:clrMapOvr>
-    <a:masterClrMapping/>
-  </p:clrMapOvr>
-  <p:timing>
-    <p:tnLst>
-      <p:par>
-        <p:cTn id="1" dur="indefinite" restart="never" nodeType="tmRoot"/>
-      </p:par>
-    </p:tnLst>
-  </p:timing>
-</p:sld>
-</file>
-
-<file path=ppt/slides/slide12.xml><?xml version="1.0" encoding="utf-8"?>
-<p:sld xmlns:a="http://schemas.openxmlformats.org/drawingml/2006/main" xmlns:r="http://schemas.openxmlformats.org/officeDocument/2006/relationships" xmlns:p="http://schemas.openxmlformats.org/presentationml/2006/main">
-  <p:cSld>
-    <p:spTree>
-      <p:nvGrpSpPr>
-        <p:cNvPr id="1" name=""/>
-        <p:cNvGrpSpPr/>
-        <p:nvPr/>
-      </p:nvGrpSpPr>
-      <p:grpSpPr>
-        <a:xfrm>
-          <a:off x="0" y="0"/>
-          <a:ext cx="0" cy="0"/>
-          <a:chOff x="0" y="0"/>
-          <a:chExt cx="0" cy="0"/>
-        </a:xfrm>
-      </p:grpSpPr>
-      <p:sp>
-        <p:nvSpPr>
-          <p:cNvPr id="2" name="Title 1"/>
-          <p:cNvSpPr>
-            <a:spLocks noGrp="1"/>
-          </p:cNvSpPr>
-          <p:nvPr>
-            <p:ph type="title"/>
-          </p:nvPr>
-        </p:nvSpPr>
-        <p:spPr/>
-        <p:txBody>
-          <a:bodyPr/>
-          <a:lstStyle/>
-          <a:p>
-            <a:r>
               <a:rPr lang="en-US" dirty="0" smtClean="0"/>
               <a:t>Acknowledgements</a:t>
             </a:r>
@@ -9737,14 +9520,14 @@
           </a:ln>
           <a:extLst>
             <a:ext uri="{909E8E84-426E-40dd-AFC4-6F175D3DCCD1}">
-              <a14:hiddenFill xmlns:a14="http://schemas.microsoft.com/office/drawing/2010/main" xmlns="">
+              <a14:hiddenFill xmlns="" xmlns:a14="http://schemas.microsoft.com/office/drawing/2010/main">
                 <a:solidFill>
                   <a:srgbClr val="FFFFFF"/>
                 </a:solidFill>
               </a14:hiddenFill>
             </a:ext>
             <a:ext uri="{91240B29-F687-4f45-9708-019B960494DF}">
-              <a14:hiddenLine xmlns:a14="http://schemas.microsoft.com/office/drawing/2010/main" xmlns="" w="9525">
+              <a14:hiddenLine xmlns="" xmlns:a14="http://schemas.microsoft.com/office/drawing/2010/main" w="9525">
                 <a:solidFill>
                   <a:srgbClr val="000000"/>
                 </a:solidFill>
@@ -9791,14 +9574,14 @@
           </a:ln>
           <a:extLst>
             <a:ext uri="{909E8E84-426E-40dd-AFC4-6F175D3DCCD1}">
-              <a14:hiddenFill xmlns:a14="http://schemas.microsoft.com/office/drawing/2010/main" xmlns="">
+              <a14:hiddenFill xmlns="" xmlns:a14="http://schemas.microsoft.com/office/drawing/2010/main">
                 <a:solidFill>
                   <a:srgbClr val="FFFFFF"/>
                 </a:solidFill>
               </a14:hiddenFill>
             </a:ext>
             <a:ext uri="{91240B29-F687-4f45-9708-019B960494DF}">
-              <a14:hiddenLine xmlns:a14="http://schemas.microsoft.com/office/drawing/2010/main" xmlns="" w="9525">
+              <a14:hiddenLine xmlns="" xmlns:a14="http://schemas.microsoft.com/office/drawing/2010/main" w="9525">
                 <a:solidFill>
                   <a:srgbClr val="000000"/>
                 </a:solidFill>
@@ -9845,14 +9628,14 @@
           </a:ln>
           <a:extLst>
             <a:ext uri="{909E8E84-426E-40dd-AFC4-6F175D3DCCD1}">
-              <a14:hiddenFill xmlns:a14="http://schemas.microsoft.com/office/drawing/2010/main" xmlns="">
+              <a14:hiddenFill xmlns="" xmlns:a14="http://schemas.microsoft.com/office/drawing/2010/main">
                 <a:solidFill>
                   <a:srgbClr val="FFFFFF"/>
                 </a:solidFill>
               </a14:hiddenFill>
             </a:ext>
             <a:ext uri="{91240B29-F687-4f45-9708-019B960494DF}">
-              <a14:hiddenLine xmlns:a14="http://schemas.microsoft.com/office/drawing/2010/main" xmlns="" w="9525">
+              <a14:hiddenLine xmlns="" xmlns:a14="http://schemas.microsoft.com/office/drawing/2010/main" w="9525">
                 <a:solidFill>
                   <a:srgbClr val="000000"/>
                 </a:solidFill>
@@ -9899,14 +9682,14 @@
           </a:ln>
           <a:extLst>
             <a:ext uri="{909E8E84-426E-40dd-AFC4-6F175D3DCCD1}">
-              <a14:hiddenFill xmlns:a14="http://schemas.microsoft.com/office/drawing/2010/main" xmlns="">
+              <a14:hiddenFill xmlns="" xmlns:a14="http://schemas.microsoft.com/office/drawing/2010/main">
                 <a:solidFill>
                   <a:srgbClr val="FFFFFF"/>
                 </a:solidFill>
               </a14:hiddenFill>
             </a:ext>
             <a:ext uri="{91240B29-F687-4f45-9708-019B960494DF}">
-              <a14:hiddenLine xmlns:a14="http://schemas.microsoft.com/office/drawing/2010/main" xmlns="" w="9525">
+              <a14:hiddenLine xmlns="" xmlns:a14="http://schemas.microsoft.com/office/drawing/2010/main" w="9525">
                 <a:solidFill>
                   <a:srgbClr val="000000"/>
                 </a:solidFill>
@@ -9953,14 +9736,14 @@
           </a:ln>
           <a:extLst>
             <a:ext uri="{909E8E84-426E-40dd-AFC4-6F175D3DCCD1}">
-              <a14:hiddenFill xmlns:a14="http://schemas.microsoft.com/office/drawing/2010/main" xmlns="">
+              <a14:hiddenFill xmlns="" xmlns:a14="http://schemas.microsoft.com/office/drawing/2010/main">
                 <a:solidFill>
                   <a:srgbClr val="FFFFFF"/>
                 </a:solidFill>
               </a14:hiddenFill>
             </a:ext>
             <a:ext uri="{91240B29-F687-4f45-9708-019B960494DF}">
-              <a14:hiddenLine xmlns:a14="http://schemas.microsoft.com/office/drawing/2010/main" xmlns="" w="9525">
+              <a14:hiddenLine xmlns="" xmlns:a14="http://schemas.microsoft.com/office/drawing/2010/main" w="9525">
                 <a:solidFill>
                   <a:srgbClr val="000000"/>
                 </a:solidFill>
@@ -10007,14 +9790,14 @@
           </a:ln>
           <a:extLst>
             <a:ext uri="{909E8E84-426E-40dd-AFC4-6F175D3DCCD1}">
-              <a14:hiddenFill xmlns:a14="http://schemas.microsoft.com/office/drawing/2010/main" xmlns="">
+              <a14:hiddenFill xmlns="" xmlns:a14="http://schemas.microsoft.com/office/drawing/2010/main">
                 <a:solidFill>
                   <a:srgbClr val="FFFFFF"/>
                 </a:solidFill>
               </a14:hiddenFill>
             </a:ext>
             <a:ext uri="{91240B29-F687-4f45-9708-019B960494DF}">
-              <a14:hiddenLine xmlns:a14="http://schemas.microsoft.com/office/drawing/2010/main" xmlns="" w="9525">
+              <a14:hiddenLine xmlns="" xmlns:a14="http://schemas.microsoft.com/office/drawing/2010/main" w="9525">
                 <a:solidFill>
                   <a:srgbClr val="000000"/>
                 </a:solidFill>
@@ -10048,14 +9831,14 @@
           </a:ln>
           <a:extLst>
             <a:ext uri="{909E8E84-426E-40dd-AFC4-6F175D3DCCD1}">
-              <a14:hiddenFill xmlns:a14="http://schemas.microsoft.com/office/drawing/2010/main" xmlns="">
+              <a14:hiddenFill xmlns="" xmlns:a14="http://schemas.microsoft.com/office/drawing/2010/main">
                 <a:solidFill>
                   <a:srgbClr val="FFFFFF"/>
                 </a:solidFill>
               </a14:hiddenFill>
             </a:ext>
             <a:ext uri="{91240B29-F687-4f45-9708-019B960494DF}">
-              <a14:hiddenLine xmlns:a14="http://schemas.microsoft.com/office/drawing/2010/main" xmlns="" w="9525">
+              <a14:hiddenLine xmlns="" xmlns:a14="http://schemas.microsoft.com/office/drawing/2010/main" w="9525">
                 <a:solidFill>
                   <a:srgbClr val="000000"/>
                 </a:solidFill>
@@ -10236,7 +10019,7 @@
 </p:sld>
 </file>
 
-<file path=ppt/slides/slide13.xml><?xml version="1.0" encoding="utf-8"?>
+<file path=ppt/slides/slide12.xml><?xml version="1.0" encoding="utf-8"?>
 <p:sld xmlns:a="http://schemas.openxmlformats.org/drawingml/2006/main" xmlns:r="http://schemas.openxmlformats.org/officeDocument/2006/relationships" xmlns:p="http://schemas.openxmlformats.org/presentationml/2006/main">
   <p:cSld>
     <p:spTree>
@@ -10451,14 +10234,14 @@
           </a:ln>
           <a:extLst>
             <a:ext uri="{909E8E84-426E-40dd-AFC4-6F175D3DCCD1}">
-              <a14:hiddenFill xmlns:a14="http://schemas.microsoft.com/office/drawing/2010/main" xmlns="">
+              <a14:hiddenFill xmlns="" xmlns:a14="http://schemas.microsoft.com/office/drawing/2010/main">
                 <a:solidFill>
                   <a:srgbClr val="FFFFFF"/>
                 </a:solidFill>
               </a14:hiddenFill>
             </a:ext>
             <a:ext uri="{91240B29-F687-4f45-9708-019B960494DF}">
-              <a14:hiddenLine xmlns:a14="http://schemas.microsoft.com/office/drawing/2010/main" xmlns="" w="9525">
+              <a14:hiddenLine xmlns="" xmlns:a14="http://schemas.microsoft.com/office/drawing/2010/main" w="9525">
                 <a:solidFill>
                   <a:srgbClr val="000000"/>
                 </a:solidFill>
@@ -10505,14 +10288,14 @@
           </a:ln>
           <a:extLst>
             <a:ext uri="{909E8E84-426E-40dd-AFC4-6F175D3DCCD1}">
-              <a14:hiddenFill xmlns:a14="http://schemas.microsoft.com/office/drawing/2010/main" xmlns="">
+              <a14:hiddenFill xmlns="" xmlns:a14="http://schemas.microsoft.com/office/drawing/2010/main">
                 <a:solidFill>
                   <a:srgbClr val="FFFFFF"/>
                 </a:solidFill>
               </a14:hiddenFill>
             </a:ext>
             <a:ext uri="{91240B29-F687-4f45-9708-019B960494DF}">
-              <a14:hiddenLine xmlns:a14="http://schemas.microsoft.com/office/drawing/2010/main" xmlns="" w="9525">
+              <a14:hiddenLine xmlns="" xmlns:a14="http://schemas.microsoft.com/office/drawing/2010/main" w="9525">
                 <a:solidFill>
                   <a:srgbClr val="000000"/>
                 </a:solidFill>
@@ -10559,14 +10342,14 @@
           </a:ln>
           <a:extLst>
             <a:ext uri="{909E8E84-426E-40dd-AFC4-6F175D3DCCD1}">
-              <a14:hiddenFill xmlns:a14="http://schemas.microsoft.com/office/drawing/2010/main" xmlns="">
+              <a14:hiddenFill xmlns="" xmlns:a14="http://schemas.microsoft.com/office/drawing/2010/main">
                 <a:solidFill>
                   <a:srgbClr val="FFFFFF"/>
                 </a:solidFill>
               </a14:hiddenFill>
             </a:ext>
             <a:ext uri="{91240B29-F687-4f45-9708-019B960494DF}">
-              <a14:hiddenLine xmlns:a14="http://schemas.microsoft.com/office/drawing/2010/main" xmlns="" w="9525">
+              <a14:hiddenLine xmlns="" xmlns:a14="http://schemas.microsoft.com/office/drawing/2010/main" w="9525">
                 <a:solidFill>
                   <a:srgbClr val="000000"/>
                 </a:solidFill>
@@ -10613,14 +10396,14 @@
           </a:ln>
           <a:extLst>
             <a:ext uri="{909E8E84-426E-40dd-AFC4-6F175D3DCCD1}">
-              <a14:hiddenFill xmlns:a14="http://schemas.microsoft.com/office/drawing/2010/main" xmlns="">
+              <a14:hiddenFill xmlns="" xmlns:a14="http://schemas.microsoft.com/office/drawing/2010/main">
                 <a:solidFill>
                   <a:srgbClr val="FFFFFF"/>
                 </a:solidFill>
               </a14:hiddenFill>
             </a:ext>
             <a:ext uri="{91240B29-F687-4f45-9708-019B960494DF}">
-              <a14:hiddenLine xmlns:a14="http://schemas.microsoft.com/office/drawing/2010/main" xmlns="" w="9525">
+              <a14:hiddenLine xmlns="" xmlns:a14="http://schemas.microsoft.com/office/drawing/2010/main" w="9525">
                 <a:solidFill>
                   <a:srgbClr val="000000"/>
                 </a:solidFill>
@@ -10667,14 +10450,14 @@
           </a:ln>
           <a:extLst>
             <a:ext uri="{909E8E84-426E-40dd-AFC4-6F175D3DCCD1}">
-              <a14:hiddenFill xmlns:a14="http://schemas.microsoft.com/office/drawing/2010/main" xmlns="">
+              <a14:hiddenFill xmlns="" xmlns:a14="http://schemas.microsoft.com/office/drawing/2010/main">
                 <a:solidFill>
                   <a:srgbClr val="FFFFFF"/>
                 </a:solidFill>
               </a14:hiddenFill>
             </a:ext>
             <a:ext uri="{91240B29-F687-4f45-9708-019B960494DF}">
-              <a14:hiddenLine xmlns:a14="http://schemas.microsoft.com/office/drawing/2010/main" xmlns="" w="9525">
+              <a14:hiddenLine xmlns="" xmlns:a14="http://schemas.microsoft.com/office/drawing/2010/main" w="9525">
                 <a:solidFill>
                   <a:srgbClr val="000000"/>
                 </a:solidFill>
@@ -10721,14 +10504,14 @@
           </a:ln>
           <a:extLst>
             <a:ext uri="{909E8E84-426E-40dd-AFC4-6F175D3DCCD1}">
-              <a14:hiddenFill xmlns:a14="http://schemas.microsoft.com/office/drawing/2010/main" xmlns="">
+              <a14:hiddenFill xmlns="" xmlns:a14="http://schemas.microsoft.com/office/drawing/2010/main">
                 <a:solidFill>
                   <a:srgbClr val="FFFFFF"/>
                 </a:solidFill>
               </a14:hiddenFill>
             </a:ext>
             <a:ext uri="{91240B29-F687-4f45-9708-019B960494DF}">
-              <a14:hiddenLine xmlns:a14="http://schemas.microsoft.com/office/drawing/2010/main" xmlns="" w="9525">
+              <a14:hiddenLine xmlns="" xmlns:a14="http://schemas.microsoft.com/office/drawing/2010/main" w="9525">
                 <a:solidFill>
                   <a:srgbClr val="000000"/>
                 </a:solidFill>
@@ -10762,14 +10545,14 @@
           </a:ln>
           <a:extLst>
             <a:ext uri="{909E8E84-426E-40dd-AFC4-6F175D3DCCD1}">
-              <a14:hiddenFill xmlns:a14="http://schemas.microsoft.com/office/drawing/2010/main" xmlns="">
+              <a14:hiddenFill xmlns="" xmlns:a14="http://schemas.microsoft.com/office/drawing/2010/main">
                 <a:solidFill>
                   <a:srgbClr val="FFFFFF"/>
                 </a:solidFill>
               </a14:hiddenFill>
             </a:ext>
             <a:ext uri="{91240B29-F687-4f45-9708-019B960494DF}">
-              <a14:hiddenLine xmlns:a14="http://schemas.microsoft.com/office/drawing/2010/main" xmlns="" w="9525">
+              <a14:hiddenLine xmlns="" xmlns:a14="http://schemas.microsoft.com/office/drawing/2010/main" w="9525">
                 <a:solidFill>
                   <a:srgbClr val="000000"/>
                 </a:solidFill>
@@ -11041,14 +10824,18 @@
           <a:lstStyle/>
           <a:p>
             <a:r>
+              <a:rPr lang="en-US" dirty="0"/>
+              <a:t>https://github.com/rishidev/perl-xs-workshop1</a:t>
+            </a:r>
+          </a:p>
+          <a:p>
+            <a:r>
               <a:rPr lang="en-US" dirty="0" smtClean="0"/>
-              <a:t>Choose a reporter!</a:t>
-            </a:r>
-          </a:p>
-          <a:p>
+              <a:t>Perl </a:t>
+            </a:r>
             <a:r>
               <a:rPr lang="en-US" dirty="0" smtClean="0"/>
-              <a:t>Perl XS</a:t>
+              <a:t>XS</a:t>
             </a:r>
           </a:p>
           <a:p>
@@ -11065,6 +10852,7 @@
               <a:rPr lang="en-US" dirty="0" smtClean="0"/>
               <a:t>)</a:t>
             </a:r>
+            <a:endParaRPr lang="en-US" dirty="0" smtClean="0"/>
           </a:p>
           <a:p>
             <a:pPr lvl="1"/>
@@ -11084,15 +10872,15 @@
           <a:p>
             <a:r>
               <a:rPr lang="en-US" dirty="0" smtClean="0"/>
-              <a:t>Bringing XS Into Ensembl (</a:t>
-            </a:r>
-            <a:r>
-              <a:rPr lang="en-US" dirty="0"/>
-              <a:t>5</a:t>
+              <a:t>Bringing XS Into </a:t>
             </a:r>
             <a:r>
               <a:rPr lang="en-US" dirty="0" smtClean="0"/>
-              <a:t> </a:t>
+              <a:t>Your Project</a:t>
+            </a:r>
+            <a:r>
+              <a:rPr lang="en-US" dirty="0" smtClean="0"/>
+              <a:t>(5 </a:t>
             </a:r>
             <a:r>
               <a:rPr lang="en-US" dirty="0" err="1" smtClean="0"/>
@@ -11102,13 +10890,6 @@
               <a:rPr lang="en-US" dirty="0" smtClean="0"/>
               <a:t>)</a:t>
             </a:r>
-          </a:p>
-          <a:p>
-            <a:r>
-              <a:rPr lang="en-US" dirty="0" smtClean="0"/>
-              <a:t>http://www.ebi.ac.uk/~rishi</a:t>
-            </a:r>
-            <a:endParaRPr lang="en-US" dirty="0" smtClean="0"/>
           </a:p>
           <a:p>
             <a:pPr lvl="1"/>
@@ -11207,8 +10988,20 @@
             <a:pPr lvl="1"/>
             <a:r>
               <a:rPr lang="en-GB" dirty="0" smtClean="0"/>
-              <a:t>runs the bytecode</a:t>
-            </a:r>
+              <a:t>runs the </a:t>
+            </a:r>
+            <a:r>
+              <a:rPr lang="en-GB" dirty="0" smtClean="0"/>
+              <a:t>bytecode</a:t>
+            </a:r>
+          </a:p>
+          <a:p>
+            <a:pPr lvl="1"/>
+            <a:r>
+              <a:rPr lang="en-GB" dirty="0" smtClean="0"/>
+              <a:t>interfaces with C libraries running locally</a:t>
+            </a:r>
+            <a:endParaRPr lang="en-GB" dirty="0" smtClean="0"/>
           </a:p>
           <a:p>
             <a:r>
@@ -11270,7 +11063,6 @@
               <a:rPr lang="en-GB" dirty="0" smtClean="0"/>
               <a:t>Custom C code or call a C Library</a:t>
             </a:r>
-            <a:endParaRPr lang="en-GB" dirty="0" smtClean="0"/>
           </a:p>
           <a:p>
             <a:endParaRPr lang="en-GB" dirty="0" smtClean="0"/>
@@ -11641,14 +11433,14 @@
               </a14:hiddenFill>
             </a:ext>
             <a:ext uri="{909E8E84-426E-40dd-AFC4-6F175D3DCCD1}">
-              <a14:hiddenFill xmlns:a14="http://schemas.microsoft.com/office/drawing/2010/main" xmlns="">
+              <a14:hiddenFill xmlns="" xmlns:a14="http://schemas.microsoft.com/office/drawing/2010/main">
                 <a:solidFill>
                   <a:srgbClr val="FFFFFF"/>
                 </a:solidFill>
               </a14:hiddenFill>
             </a:ext>
             <a:ext uri="{91240B29-F687-4f45-9708-019B960494DF}">
-              <a14:hiddenLine xmlns:a14="http://schemas.microsoft.com/office/drawing/2010/main" xmlns="" w="9525">
+              <a14:hiddenLine xmlns="" xmlns:a14="http://schemas.microsoft.com/office/drawing/2010/main" w="9525">
                 <a:solidFill>
                   <a:srgbClr val="000000"/>
                 </a:solidFill>
@@ -11658,7 +11450,7 @@
               </a14:hiddenLine>
             </a:ext>
             <a:ext uri="{FAA26D3D-D897-4be2-8F04-BA451C77F1D7}">
-              <ma14:placeholderFlag xmlns:ma14="http://schemas.microsoft.com/office/mac/drawingml/2011/main" xmlns="" val="1"/>
+              <ma14:placeholderFlag xmlns="" xmlns:ma14="http://schemas.microsoft.com/office/mac/drawingml/2011/main" val="1"/>
             </a:ext>
           </a:extLst>
         </p:spPr>
@@ -11918,11 +11710,7 @@
           <a:p>
             <a:r>
               <a:rPr lang="en-GB" dirty="0" smtClean="0"/>
-              <a:t>Workshop Start: Perl </a:t>
-            </a:r>
-            <a:r>
-              <a:rPr lang="en-GB" dirty="0" smtClean="0"/>
-              <a:t>XS</a:t>
+              <a:t>Workshop Start: Perl XS</a:t>
             </a:r>
             <a:endParaRPr lang="en-GB" dirty="0"/>
           </a:p>
@@ -12148,29 +11936,48 @@
           <a:p>
             <a:r>
               <a:rPr lang="en-GB" dirty="0" smtClean="0"/>
-              <a:t>Workshop End</a:t>
-            </a:r>
-            <a:r>
-              <a:rPr lang="en-GB" dirty="0" smtClean="0"/>
-              <a:t>: </a:t>
-            </a:r>
-            <a:r>
-              <a:rPr lang="en-GB" dirty="0" smtClean="0"/>
-              <a:t>Calling A C Library</a:t>
+              <a:t>Workshop End: Calling A C Library</a:t>
             </a:r>
             <a:endParaRPr lang="en-GB" dirty="0"/>
+          </a:p>
+        </p:txBody>
+      </p:sp>
+      <p:sp>
+        <p:nvSpPr>
+          <p:cNvPr id="8" name="TextBox 7"/>
+          <p:cNvSpPr txBox="1"/>
+          <p:nvPr/>
+        </p:nvSpPr>
+        <p:spPr>
+          <a:xfrm>
+            <a:off x="604284" y="1428961"/>
+            <a:ext cx="1832275" cy="369332"/>
+          </a:xfrm>
+          <a:prstGeom prst="rect">
+            <a:avLst/>
+          </a:prstGeom>
+          <a:noFill/>
+        </p:spPr>
+        <p:txBody>
+          <a:bodyPr wrap="square" rtlCol="0">
+            <a:spAutoFit/>
+          </a:bodyPr>
+          <a:lstStyle/>
+          <a:p>
+            <a:r>
+              <a:rPr lang="en-GB" dirty="0"/>
+              <a:t>XS Code</a:t>
+            </a:r>
           </a:p>
         </p:txBody>
       </p:sp>
       <p:pic>
         <p:nvPicPr>
-          <p:cNvPr id="6" name="Content Placeholder 5"/>
+          <p:cNvPr id="4" name="Picture 3"/>
           <p:cNvPicPr>
-            <a:picLocks noGrp="1" noChangeAspect="1"/>
+            <a:picLocks noChangeAspect="1"/>
           </p:cNvPicPr>
-          <p:nvPr>
-            <p:ph sz="half" idx="2"/>
-          </p:nvPr>
+          <p:nvPr/>
         </p:nvPicPr>
         <p:blipFill>
           <a:blip r:embed="rId3"/>
@@ -12180,8 +11987,8 @@
         </p:blipFill>
         <p:spPr>
           <a:xfrm>
-            <a:off x="482362" y="1554895"/>
-            <a:ext cx="3502948" cy="4343400"/>
+            <a:off x="117614" y="1888643"/>
+            <a:ext cx="4410075" cy="3238500"/>
           </a:xfrm>
           <a:prstGeom prst="rect">
             <a:avLst/>
@@ -12190,14 +11997,14 @@
       </p:pic>
       <p:sp>
         <p:nvSpPr>
-          <p:cNvPr id="8" name="TextBox 7"/>
+          <p:cNvPr id="9" name="TextBox 8"/>
           <p:cNvSpPr txBox="1"/>
           <p:nvPr/>
         </p:nvSpPr>
         <p:spPr>
           <a:xfrm>
-            <a:off x="482364" y="1214042"/>
-            <a:ext cx="1832275" cy="369332"/>
+            <a:off x="4653859" y="1447804"/>
+            <a:ext cx="1767047" cy="646331"/>
           </a:xfrm>
           <a:prstGeom prst="rect">
             <a:avLst/>
@@ -12211,148 +12018,92 @@
           <a:lstStyle/>
           <a:p>
             <a:r>
+              <a:rPr lang="en-GB" dirty="0" smtClean="0"/>
+              <a:t>Makefile.PL</a:t>
+            </a:r>
+          </a:p>
+          <a:p>
+            <a:endParaRPr lang="en-GB" dirty="0"/>
+          </a:p>
+        </p:txBody>
+      </p:sp>
+      <p:sp>
+        <p:nvSpPr>
+          <p:cNvPr id="12" name="TextBox 11"/>
+          <p:cNvSpPr txBox="1"/>
+          <p:nvPr/>
+        </p:nvSpPr>
+        <p:spPr>
+          <a:xfrm>
+            <a:off x="4653859" y="4408827"/>
+            <a:ext cx="1386942" cy="369332"/>
+          </a:xfrm>
+          <a:prstGeom prst="rect">
+            <a:avLst/>
+          </a:prstGeom>
+          <a:noFill/>
+        </p:spPr>
+        <p:txBody>
+          <a:bodyPr wrap="square" rtlCol="0">
+            <a:spAutoFit/>
+          </a:bodyPr>
+          <a:lstStyle/>
+          <a:p>
+            <a:r>
               <a:rPr lang="en-GB" dirty="0"/>
-              <a:t>XS Code</a:t>
-            </a:r>
-          </a:p>
-        </p:txBody>
-      </p:sp>
-      <p:grpSp>
-        <p:nvGrpSpPr>
-          <p:cNvPr id="10" name="Group 9"/>
-          <p:cNvGrpSpPr/>
+              <a:t>Perl code</a:t>
+            </a:r>
+          </a:p>
+        </p:txBody>
+      </p:sp>
+      <p:pic>
+        <p:nvPicPr>
+          <p:cNvPr id="5" name="Picture 4"/>
+          <p:cNvPicPr>
+            <a:picLocks noChangeAspect="1"/>
+          </p:cNvPicPr>
           <p:nvPr/>
-        </p:nvGrpSpPr>
-        <p:grpSpPr>
+        </p:nvPicPr>
+        <p:blipFill>
+          <a:blip r:embed="rId4"/>
+          <a:stretch>
+            <a:fillRect/>
+          </a:stretch>
+        </p:blipFill>
+        <p:spPr>
           <a:xfrm>
-            <a:off x="4253264" y="1447804"/>
-            <a:ext cx="4639122" cy="2319610"/>
-            <a:chOff x="4148937" y="1524261"/>
-            <a:chExt cx="4639122" cy="2319610"/>
+            <a:off x="4253266" y="1798293"/>
+            <a:ext cx="4490140" cy="2433907"/>
           </a:xfrm>
-        </p:grpSpPr>
-        <p:pic>
-          <p:nvPicPr>
-            <p:cNvPr id="7" name="Picture 6"/>
-            <p:cNvPicPr>
-              <a:picLocks noChangeAspect="1"/>
-            </p:cNvPicPr>
-            <p:nvPr/>
-          </p:nvPicPr>
-          <p:blipFill>
-            <a:blip r:embed="rId4"/>
-            <a:stretch>
-              <a:fillRect/>
-            </a:stretch>
-          </p:blipFill>
-          <p:spPr>
-            <a:xfrm>
-              <a:off x="4148937" y="1893593"/>
-              <a:ext cx="4639122" cy="1950278"/>
-            </a:xfrm>
-            <a:prstGeom prst="rect">
-              <a:avLst/>
-            </a:prstGeom>
-          </p:spPr>
-        </p:pic>
-        <p:sp>
-          <p:nvSpPr>
-            <p:cNvPr id="9" name="TextBox 8"/>
-            <p:cNvSpPr txBox="1"/>
-            <p:nvPr/>
-          </p:nvSpPr>
-          <p:spPr>
-            <a:xfrm>
-              <a:off x="4148937" y="1524261"/>
-              <a:ext cx="1767047" cy="369332"/>
-            </a:xfrm>
-            <a:prstGeom prst="rect">
-              <a:avLst/>
-            </a:prstGeom>
-            <a:noFill/>
-          </p:spPr>
-          <p:txBody>
-            <a:bodyPr wrap="square" rtlCol="0">
-              <a:spAutoFit/>
-            </a:bodyPr>
-            <a:lstStyle/>
-            <a:p>
-              <a:r>
-                <a:rPr lang="en-GB" dirty="0"/>
-                <a:t>Makefile.PL</a:t>
-              </a:r>
-            </a:p>
-          </p:txBody>
-        </p:sp>
-      </p:grpSp>
-      <p:grpSp>
-        <p:nvGrpSpPr>
-          <p:cNvPr id="13" name="Group 12"/>
-          <p:cNvGrpSpPr/>
+          <a:prstGeom prst="rect">
+            <a:avLst/>
+          </a:prstGeom>
+        </p:spPr>
+      </p:pic>
+      <p:pic>
+        <p:nvPicPr>
+          <p:cNvPr id="14" name="Picture 13"/>
+          <p:cNvPicPr>
+            <a:picLocks noChangeAspect="1"/>
+          </p:cNvPicPr>
           <p:nvPr/>
-        </p:nvGrpSpPr>
-        <p:grpSpPr>
+        </p:nvPicPr>
+        <p:blipFill>
+          <a:blip r:embed="rId5"/>
+          <a:stretch>
+            <a:fillRect/>
+          </a:stretch>
+        </p:blipFill>
+        <p:spPr>
           <a:xfrm>
-            <a:off x="4253265" y="4265155"/>
-            <a:ext cx="4672289" cy="1380804"/>
-            <a:chOff x="4253263" y="4265155"/>
-            <a:chExt cx="4672289" cy="1380804"/>
+            <a:off x="4009481" y="4778159"/>
+            <a:ext cx="4733925" cy="1190625"/>
           </a:xfrm>
-        </p:grpSpPr>
-        <p:pic>
-          <p:nvPicPr>
-            <p:cNvPr id="11" name="Picture 10"/>
-            <p:cNvPicPr>
-              <a:picLocks noChangeAspect="1"/>
-            </p:cNvPicPr>
-            <p:nvPr/>
-          </p:nvPicPr>
-          <p:blipFill>
-            <a:blip r:embed="rId5"/>
-            <a:stretch>
-              <a:fillRect/>
-            </a:stretch>
-          </p:blipFill>
-          <p:spPr>
-            <a:xfrm>
-              <a:off x="4253263" y="4570424"/>
-              <a:ext cx="4672289" cy="1075535"/>
-            </a:xfrm>
-            <a:prstGeom prst="rect">
-              <a:avLst/>
-            </a:prstGeom>
-          </p:spPr>
-        </p:pic>
-        <p:sp>
-          <p:nvSpPr>
-            <p:cNvPr id="12" name="TextBox 11"/>
-            <p:cNvSpPr txBox="1"/>
-            <p:nvPr/>
-          </p:nvSpPr>
-          <p:spPr>
-            <a:xfrm>
-              <a:off x="4253264" y="4265155"/>
-              <a:ext cx="1386942" cy="369332"/>
-            </a:xfrm>
-            <a:prstGeom prst="rect">
-              <a:avLst/>
-            </a:prstGeom>
-            <a:noFill/>
-          </p:spPr>
-          <p:txBody>
-            <a:bodyPr wrap="square" rtlCol="0">
-              <a:spAutoFit/>
-            </a:bodyPr>
-            <a:lstStyle/>
-            <a:p>
-              <a:r>
-                <a:rPr lang="en-GB" dirty="0"/>
-                <a:t>Perl code</a:t>
-              </a:r>
-            </a:p>
-          </p:txBody>
-        </p:sp>
-      </p:grpSp>
+          <a:prstGeom prst="rect">
+            <a:avLst/>
+          </a:prstGeom>
+        </p:spPr>
+      </p:pic>
     </p:spTree>
     <p:extLst>
       <p:ext uri="{BB962C8B-B14F-4D97-AF65-F5344CB8AC3E}">
@@ -12429,31 +12180,22 @@
           <a:lstStyle/>
           <a:p>
             <a:r>
-              <a:rPr lang="en-GB" dirty="0">
-                <a:hlinkClick r:id="rId2"/>
-              </a:rPr>
-              <a:t>http://www.ebi.ac.uk/~rishi/2015_ensembl_retreat</a:t>
-            </a:r>
-            <a:r>
-              <a:rPr lang="en-GB" dirty="0" smtClean="0">
-                <a:hlinkClick r:id="rId2"/>
-              </a:rPr>
-              <a:t>/</a:t>
-            </a:r>
-            <a:endParaRPr lang="en-GB" dirty="0" smtClean="0"/>
-          </a:p>
-          <a:p>
-            <a:r>
               <a:rPr lang="en-GB" dirty="0" smtClean="0"/>
               <a:t>Pre-requisites</a:t>
             </a:r>
+            <a:endParaRPr lang="en-GB" dirty="0" smtClean="0"/>
           </a:p>
           <a:p>
             <a:pPr lvl="1"/>
             <a:r>
               <a:rPr lang="en-GB" dirty="0" smtClean="0"/>
-              <a:t>Perl, C build tools</a:t>
-            </a:r>
+              <a:t>Perl, C build </a:t>
+            </a:r>
+            <a:r>
+              <a:rPr lang="en-GB" dirty="0" smtClean="0"/>
+              <a:t>tools, Git</a:t>
+            </a:r>
+            <a:endParaRPr lang="en-GB" dirty="0" smtClean="0"/>
           </a:p>
           <a:p>
             <a:r>
@@ -12498,15 +12240,13 @@
             </a:pPr>
             <a:r>
               <a:rPr lang="en-GB" dirty="0" smtClean="0"/>
-              <a:t>Using a C Library</a:t>
-            </a:r>
-          </a:p>
-          <a:p>
+              <a:t>Using a C </a:t>
+            </a:r>
             <a:r>
               <a:rPr lang="en-GB" dirty="0" smtClean="0"/>
-              <a:t>Not necessarily to be completed in this session</a:t>
-            </a:r>
-            <a:endParaRPr lang="en-GB" dirty="0"/>
+              <a:t>Library</a:t>
+            </a:r>
+            <a:endParaRPr lang="en-GB" dirty="0" smtClean="0"/>
           </a:p>
         </p:txBody>
       </p:sp>
@@ -12557,7 +12297,11 @@
           <a:p>
             <a:r>
               <a:rPr lang="en-GB" dirty="0" smtClean="0"/>
-              <a:t>Part 3: Bringing XS into Ensembl</a:t>
+              <a:t>Part 3: Bringing XS </a:t>
+            </a:r>
+            <a:r>
+              <a:rPr lang="en-GB" dirty="0" smtClean="0"/>
+              <a:t>into Your Project</a:t>
             </a:r>
             <a:endParaRPr lang="en-GB" dirty="0"/>
           </a:p>
@@ -12634,11 +12378,7 @@
             <a:pPr lvl="1"/>
             <a:r>
               <a:rPr lang="en-GB" dirty="0" smtClean="0"/>
-              <a:t>used </a:t>
-            </a:r>
-            <a:r>
-              <a:rPr lang="en-GB" dirty="0" smtClean="0"/>
-              <a:t>frequently</a:t>
+              <a:t>used frequently</a:t>
             </a:r>
           </a:p>
           <a:p>

</xml_diff>